<commit_message>
updated version with feature importance and visual graphs
</commit_message>
<xml_diff>
--- a/case_study/Telco_Churn/Alamelu Ramanathan - Final  Presentation.pptx
+++ b/case_study/Telco_Churn/Alamelu Ramanathan - Final  Presentation.pptx
@@ -24,16 +24,17 @@
     <p:sldId id="269" r:id="rId18"/>
     <p:sldId id="270" r:id="rId19"/>
     <p:sldId id="271" r:id="rId20"/>
+    <p:sldId id="272" r:id="rId21"/>
   </p:sldIdLst>
   <p:sldSz cy="6858000" cx="12192000"/>
   <p:notesSz cx="6858000" cy="9144000"/>
   <p:embeddedFontLst>
     <p:embeddedFont>
       <p:font typeface="Montserrat"/>
-      <p:regular r:id="rId21"/>
-      <p:bold r:id="rId22"/>
-      <p:italic r:id="rId23"/>
-      <p:boldItalic r:id="rId24"/>
+      <p:regular r:id="rId22"/>
+      <p:bold r:id="rId23"/>
+      <p:italic r:id="rId24"/>
+      <p:boldItalic r:id="rId25"/>
     </p:embeddedFont>
   </p:embeddedFontLst>
   <p:defaultTextStyle>
@@ -2064,7 +2065,7 @@
   <p:cSld>
     <p:spTree>
       <p:nvGrpSpPr>
-        <p:cNvPr id="186" name="Shape 186"/>
+        <p:cNvPr id="184" name="Shape 184"/>
         <p:cNvGrpSpPr/>
         <p:nvPr/>
       </p:nvGrpSpPr>
@@ -2078,7 +2079,7 @@
       </p:grpSpPr>
       <p:sp>
         <p:nvSpPr>
-          <p:cNvPr id="187" name="Google Shape;187;p12:notes"/>
+          <p:cNvPr id="185" name="Google Shape;185;p12:notes"/>
           <p:cNvSpPr/>
           <p:nvPr>
             <p:ph idx="2" type="sldImg"/>
@@ -2123,7 +2124,7 @@
       </p:sp>
       <p:sp>
         <p:nvSpPr>
-          <p:cNvPr id="188" name="Google Shape;188;p12:notes"/>
+          <p:cNvPr id="186" name="Google Shape;186;p12:notes"/>
           <p:cNvSpPr txBox="1"/>
           <p:nvPr>
             <p:ph idx="1" type="body"/>
@@ -2185,7 +2186,7 @@
   <p:cSld>
     <p:spTree>
       <p:nvGrpSpPr>
-        <p:cNvPr id="194" name="Shape 194"/>
+        <p:cNvPr id="192" name="Shape 192"/>
         <p:cNvGrpSpPr/>
         <p:nvPr/>
       </p:nvGrpSpPr>
@@ -2199,7 +2200,7 @@
       </p:grpSpPr>
       <p:sp>
         <p:nvSpPr>
-          <p:cNvPr id="195" name="Google Shape;195;p13:notes"/>
+          <p:cNvPr id="193" name="Google Shape;193;p13:notes"/>
           <p:cNvSpPr txBox="1"/>
           <p:nvPr>
             <p:ph idx="1" type="body"/>
@@ -2246,7 +2247,7 @@
       </p:sp>
       <p:sp>
         <p:nvSpPr>
-          <p:cNvPr id="196" name="Google Shape;196;p13:notes"/>
+          <p:cNvPr id="194" name="Google Shape;194;p13:notes"/>
           <p:cNvSpPr/>
           <p:nvPr>
             <p:ph idx="2" type="sldImg"/>
@@ -2302,7 +2303,7 @@
   <p:cSld>
     <p:spTree>
       <p:nvGrpSpPr>
-        <p:cNvPr id="203" name="Shape 203"/>
+        <p:cNvPr id="201" name="Shape 201"/>
         <p:cNvGrpSpPr/>
         <p:nvPr/>
       </p:nvGrpSpPr>
@@ -2316,7 +2317,7 @@
       </p:grpSpPr>
       <p:sp>
         <p:nvSpPr>
-          <p:cNvPr id="204" name="Google Shape;204;p14:notes"/>
+          <p:cNvPr id="202" name="Google Shape;202;p14:notes"/>
           <p:cNvSpPr txBox="1"/>
           <p:nvPr>
             <p:ph idx="1" type="body"/>
@@ -2363,7 +2364,7 @@
       </p:sp>
       <p:sp>
         <p:nvSpPr>
-          <p:cNvPr id="205" name="Google Shape;205;p14:notes"/>
+          <p:cNvPr id="203" name="Google Shape;203;p14:notes"/>
           <p:cNvSpPr/>
           <p:nvPr>
             <p:ph idx="2" type="sldImg"/>
@@ -2419,7 +2420,7 @@
   <p:cSld>
     <p:spTree>
       <p:nvGrpSpPr>
-        <p:cNvPr id="212" name="Shape 212"/>
+        <p:cNvPr id="210" name="Shape 210"/>
         <p:cNvGrpSpPr/>
         <p:nvPr/>
       </p:nvGrpSpPr>
@@ -2433,7 +2434,7 @@
       </p:grpSpPr>
       <p:sp>
         <p:nvSpPr>
-          <p:cNvPr id="213" name="Google Shape;213;p16:notes"/>
+          <p:cNvPr id="211" name="Google Shape;211;g30f48fe88b2_0_3:notes"/>
           <p:cNvSpPr txBox="1"/>
           <p:nvPr>
             <p:ph idx="1" type="body"/>
@@ -2442,7 +2443,7 @@
         <p:spPr>
           <a:xfrm>
             <a:off x="685800" y="4400550"/>
-            <a:ext cx="5486400" cy="3600450"/>
+            <a:ext cx="5486400" cy="3600600"/>
           </a:xfrm>
           <a:prstGeom prst="rect">
             <a:avLst/>
@@ -2480,7 +2481,7 @@
       </p:sp>
       <p:sp>
         <p:nvSpPr>
-          <p:cNvPr id="214" name="Google Shape;214;p16:notes"/>
+          <p:cNvPr id="212" name="Google Shape;212;g30f48fe88b2_0_3:notes"/>
           <p:cNvSpPr/>
           <p:nvPr>
             <p:ph idx="2" type="sldImg"/>
@@ -2536,7 +2537,7 @@
   <p:cSld>
     <p:spTree>
       <p:nvGrpSpPr>
-        <p:cNvPr id="220" name="Shape 220"/>
+        <p:cNvPr id="219" name="Shape 219"/>
         <p:cNvGrpSpPr/>
         <p:nvPr/>
       </p:nvGrpSpPr>
@@ -2550,7 +2551,124 @@
       </p:grpSpPr>
       <p:sp>
         <p:nvSpPr>
-          <p:cNvPr id="221" name="Google Shape;221;p17:notes"/>
+          <p:cNvPr id="220" name="Google Shape;220;p16:notes"/>
+          <p:cNvSpPr txBox="1"/>
+          <p:nvPr>
+            <p:ph idx="1" type="body"/>
+          </p:nvPr>
+        </p:nvSpPr>
+        <p:spPr>
+          <a:xfrm>
+            <a:off x="685800" y="4400550"/>
+            <a:ext cx="5486400" cy="3600450"/>
+          </a:xfrm>
+          <a:prstGeom prst="rect">
+            <a:avLst/>
+          </a:prstGeom>
+          <a:noFill/>
+          <a:ln>
+            <a:noFill/>
+          </a:ln>
+        </p:spPr>
+        <p:txBody>
+          <a:bodyPr anchorCtr="0" anchor="t" bIns="45700" lIns="91425" spcFirstLastPara="1" rIns="91425" wrap="square" tIns="45700">
+            <a:noAutofit/>
+          </a:bodyPr>
+          <a:lstStyle/>
+          <a:p>
+            <a:pPr indent="0" lvl="0" marL="0" rtl="0" algn="l">
+              <a:lnSpc>
+                <a:spcPct val="100000"/>
+              </a:lnSpc>
+              <a:spcBef>
+                <a:spcPts val="0"/>
+              </a:spcBef>
+              <a:spcAft>
+                <a:spcPts val="0"/>
+              </a:spcAft>
+              <a:buSzPts val="1400"/>
+              <a:buNone/>
+            </a:pPr>
+            <a:r>
+              <a:t/>
+            </a:r>
+            <a:endParaRPr/>
+          </a:p>
+        </p:txBody>
+      </p:sp>
+      <p:sp>
+        <p:nvSpPr>
+          <p:cNvPr id="221" name="Google Shape;221;p16:notes"/>
+          <p:cNvSpPr/>
+          <p:nvPr>
+            <p:ph idx="2" type="sldImg"/>
+          </p:nvPr>
+        </p:nvSpPr>
+        <p:spPr>
+          <a:xfrm>
+            <a:off x="685800" y="1143000"/>
+            <a:ext cx="5486400" cy="3086100"/>
+          </a:xfrm>
+          <a:custGeom>
+            <a:rect b="b" l="l" r="r" t="t"/>
+            <a:pathLst>
+              <a:path extrusionOk="0" h="120000" w="120000">
+                <a:moveTo>
+                  <a:pt x="0" y="0"/>
+                </a:moveTo>
+                <a:lnTo>
+                  <a:pt x="120000" y="0"/>
+                </a:lnTo>
+                <a:lnTo>
+                  <a:pt x="120000" y="120000"/>
+                </a:lnTo>
+                <a:lnTo>
+                  <a:pt x="0" y="120000"/>
+                </a:lnTo>
+                <a:close/>
+              </a:path>
+            </a:pathLst>
+          </a:custGeom>
+          <a:noFill/>
+          <a:ln cap="flat" cmpd="sng" w="12700">
+            <a:solidFill>
+              <a:srgbClr val="000000"/>
+            </a:solidFill>
+            <a:prstDash val="solid"/>
+            <a:round/>
+            <a:headEnd len="sm" w="sm" type="none"/>
+            <a:tailEnd len="sm" w="sm" type="none"/>
+          </a:ln>
+        </p:spPr>
+      </p:sp>
+    </p:spTree>
+  </p:cSld>
+  <p:clrMapOvr>
+    <a:masterClrMapping/>
+  </p:clrMapOvr>
+</p:notes>
+</file>
+
+<file path=ppt/notesSlides/notesSlide17.xml><?xml version="1.0" encoding="utf-8"?>
+<p:notes xmlns:a="http://schemas.openxmlformats.org/drawingml/2006/main" xmlns:r="http://schemas.openxmlformats.org/officeDocument/2006/relationships" xmlns:mc="http://schemas.openxmlformats.org/markup-compatibility/2006" xmlns:mv="urn:schemas-microsoft-com:mac:vml" xmlns:p="http://schemas.openxmlformats.org/presentationml/2006/main" xmlns:c="http://schemas.openxmlformats.org/drawingml/2006/chart" xmlns:dgm="http://schemas.openxmlformats.org/drawingml/2006/diagram" xmlns:o="urn:schemas-microsoft-com:office:office" xmlns:v="urn:schemas-microsoft-com:vml" xmlns:pvml="urn:schemas-microsoft-com:office:powerpoint" xmlns:com="http://schemas.openxmlformats.org/drawingml/2006/compatibility" xmlns:p14="http://schemas.microsoft.com/office/powerpoint/2010/main" xmlns:p15="http://schemas.microsoft.com/office/powerpoint/2012/main" xmlns:ahyp="http://schemas.microsoft.com/office/drawing/2018/hyperlinkcolor" showMasterPhAnim="0" showMasterSp="0">
+  <p:cSld>
+    <p:spTree>
+      <p:nvGrpSpPr>
+        <p:cNvPr id="227" name="Shape 227"/>
+        <p:cNvGrpSpPr/>
+        <p:nvPr/>
+      </p:nvGrpSpPr>
+      <p:grpSpPr>
+        <a:xfrm>
+          <a:off x="0" y="0"/>
+          <a:ext cx="0" cy="0"/>
+          <a:chOff x="0" y="0"/>
+          <a:chExt cx="0" cy="0"/>
+        </a:xfrm>
+      </p:grpSpPr>
+      <p:sp>
+        <p:nvSpPr>
+          <p:cNvPr id="228" name="Google Shape;228;p17:notes"/>
           <p:cNvSpPr/>
           <p:nvPr>
             <p:ph idx="2" type="sldImg"/>
@@ -2595,7 +2713,7 @@
       </p:sp>
       <p:sp>
         <p:nvSpPr>
-          <p:cNvPr id="222" name="Google Shape;222;p17:notes"/>
+          <p:cNvPr id="229" name="Google Shape;229;p17:notes"/>
           <p:cNvSpPr txBox="1"/>
           <p:nvPr>
             <p:ph idx="1" type="body"/>
@@ -18404,71 +18522,18 @@
           <p:cNvPicPr preferRelativeResize="0"/>
           <p:nvPr/>
         </p:nvPicPr>
-        <p:blipFill rotWithShape="1">
+        <p:blipFill>
           <a:blip r:embed="rId4">
             <a:alphaModFix/>
           </a:blip>
-          <a:srcRect b="0" l="0" r="0" t="0"/>
-          <a:stretch/>
+          <a:stretch>
+            <a:fillRect/>
+          </a:stretch>
         </p:blipFill>
         <p:spPr>
           <a:xfrm>
-            <a:off x="92925" y="3194475"/>
-            <a:ext cx="3628075" cy="3739726"/>
-          </a:xfrm>
-          <a:prstGeom prst="rect">
-            <a:avLst/>
-          </a:prstGeom>
-          <a:noFill/>
-          <a:ln>
-            <a:noFill/>
-          </a:ln>
-        </p:spPr>
-      </p:pic>
-      <p:pic>
-        <p:nvPicPr>
-          <p:cNvPr id="184" name="Google Shape;184;p25"/>
-          <p:cNvPicPr preferRelativeResize="0"/>
-          <p:nvPr/>
-        </p:nvPicPr>
-        <p:blipFill rotWithShape="1">
-          <a:blip r:embed="rId5">
-            <a:alphaModFix/>
-          </a:blip>
-          <a:srcRect b="0" l="0" r="0" t="0"/>
-          <a:stretch/>
-        </p:blipFill>
-        <p:spPr>
-          <a:xfrm>
-            <a:off x="4320500" y="3194475"/>
-            <a:ext cx="3269950" cy="3833501"/>
-          </a:xfrm>
-          <a:prstGeom prst="rect">
-            <a:avLst/>
-          </a:prstGeom>
-          <a:noFill/>
-          <a:ln>
-            <a:noFill/>
-          </a:ln>
-        </p:spPr>
-      </p:pic>
-      <p:pic>
-        <p:nvPicPr>
-          <p:cNvPr id="185" name="Google Shape;185;p25"/>
-          <p:cNvPicPr preferRelativeResize="0"/>
-          <p:nvPr/>
-        </p:nvPicPr>
-        <p:blipFill rotWithShape="1">
-          <a:blip r:embed="rId6">
-            <a:alphaModFix/>
-          </a:blip>
-          <a:srcRect b="0" l="0" r="0" t="0"/>
-          <a:stretch/>
-        </p:blipFill>
-        <p:spPr>
-          <a:xfrm>
-            <a:off x="8394549" y="3147588"/>
-            <a:ext cx="3504302" cy="3681099"/>
+            <a:off x="0" y="2961925"/>
+            <a:ext cx="10060326" cy="3749750"/>
           </a:xfrm>
           <a:prstGeom prst="rect">
             <a:avLst/>
@@ -18492,7 +18557,7 @@
   <p:cSld>
     <p:spTree>
       <p:nvGrpSpPr>
-        <p:cNvPr id="189" name="Shape 189"/>
+        <p:cNvPr id="187" name="Shape 187"/>
         <p:cNvGrpSpPr/>
         <p:nvPr/>
       </p:nvGrpSpPr>
@@ -18506,7 +18571,7 @@
       </p:grpSpPr>
       <p:sp>
         <p:nvSpPr>
-          <p:cNvPr id="190" name="Google Shape;190;p26"/>
+          <p:cNvPr id="188" name="Google Shape;188;p26"/>
           <p:cNvSpPr/>
           <p:nvPr/>
         </p:nvSpPr>
@@ -18602,7 +18667,7 @@
       </p:sp>
       <p:sp>
         <p:nvSpPr>
-          <p:cNvPr id="191" name="Google Shape;191;p26"/>
+          <p:cNvPr id="189" name="Google Shape;189;p26"/>
           <p:cNvSpPr txBox="1"/>
           <p:nvPr/>
         </p:nvSpPr>
@@ -18668,7 +18733,7 @@
       </p:sp>
       <p:sp>
         <p:nvSpPr>
-          <p:cNvPr id="192" name="Google Shape;192;p26"/>
+          <p:cNvPr id="190" name="Google Shape;190;p26"/>
           <p:cNvSpPr txBox="1"/>
           <p:nvPr>
             <p:ph idx="12" type="sldNum"/>
@@ -18720,7 +18785,7 @@
       </p:sp>
       <p:pic>
         <p:nvPicPr>
-          <p:cNvPr id="193" name="Google Shape;193;p26"/>
+          <p:cNvPr id="191" name="Google Shape;191;p26"/>
           <p:cNvPicPr preferRelativeResize="0"/>
           <p:nvPr/>
         </p:nvPicPr>
@@ -18758,7 +18823,7 @@
   <p:cSld>
     <p:spTree>
       <p:nvGrpSpPr>
-        <p:cNvPr id="197" name="Shape 197"/>
+        <p:cNvPr id="195" name="Shape 195"/>
         <p:cNvGrpSpPr/>
         <p:nvPr/>
       </p:nvGrpSpPr>
@@ -18772,7 +18837,7 @@
       </p:grpSpPr>
       <p:sp>
         <p:nvSpPr>
-          <p:cNvPr id="198" name="Google Shape;198;p27"/>
+          <p:cNvPr id="196" name="Google Shape;196;p27"/>
           <p:cNvSpPr txBox="1"/>
           <p:nvPr/>
         </p:nvSpPr>
@@ -18838,7 +18903,7 @@
       </p:sp>
       <p:sp>
         <p:nvSpPr>
-          <p:cNvPr id="199" name="Google Shape;199;p27"/>
+          <p:cNvPr id="197" name="Google Shape;197;p27"/>
           <p:cNvSpPr txBox="1"/>
           <p:nvPr/>
         </p:nvSpPr>
@@ -18926,7 +18991,7 @@
       </p:sp>
       <p:sp>
         <p:nvSpPr>
-          <p:cNvPr id="200" name="Google Shape;200;p27"/>
+          <p:cNvPr id="198" name="Google Shape;198;p27"/>
           <p:cNvSpPr txBox="1"/>
           <p:nvPr>
             <p:ph idx="12" type="sldNum"/>
@@ -18978,7 +19043,7 @@
       </p:sp>
       <p:pic>
         <p:nvPicPr>
-          <p:cNvPr id="201" name="Google Shape;201;p27"/>
+          <p:cNvPr id="199" name="Google Shape;199;p27"/>
           <p:cNvPicPr preferRelativeResize="0"/>
           <p:nvPr/>
         </p:nvPicPr>
@@ -18991,7 +19056,7 @@
         </p:blipFill>
         <p:spPr>
           <a:xfrm>
-            <a:off x="2044650" y="2401000"/>
+            <a:off x="2056500" y="2133125"/>
             <a:ext cx="5076926" cy="4949649"/>
           </a:xfrm>
           <a:prstGeom prst="rect">
@@ -19005,13 +19070,13 @@
       </p:pic>
       <p:sp>
         <p:nvSpPr>
-          <p:cNvPr id="202" name="Google Shape;202;p27"/>
+          <p:cNvPr id="200" name="Google Shape;200;p27"/>
           <p:cNvSpPr txBox="1"/>
           <p:nvPr/>
         </p:nvSpPr>
         <p:spPr>
           <a:xfrm>
-            <a:off x="225200" y="1347525"/>
+            <a:off x="225200" y="1153450"/>
             <a:ext cx="11540700" cy="769500"/>
           </a:xfrm>
           <a:prstGeom prst="rect">
@@ -19134,7 +19199,7 @@
   <p:cSld>
     <p:spTree>
       <p:nvGrpSpPr>
-        <p:cNvPr id="206" name="Shape 206"/>
+        <p:cNvPr id="204" name="Shape 204"/>
         <p:cNvGrpSpPr/>
         <p:nvPr/>
       </p:nvGrpSpPr>
@@ -19148,7 +19213,7 @@
       </p:grpSpPr>
       <p:sp>
         <p:nvSpPr>
-          <p:cNvPr id="207" name="Google Shape;207;p28"/>
+          <p:cNvPr id="205" name="Google Shape;205;p28"/>
           <p:cNvSpPr txBox="1"/>
           <p:nvPr/>
         </p:nvSpPr>
@@ -19214,7 +19279,7 @@
       </p:sp>
       <p:sp>
         <p:nvSpPr>
-          <p:cNvPr id="208" name="Google Shape;208;p28"/>
+          <p:cNvPr id="206" name="Google Shape;206;p28"/>
           <p:cNvSpPr txBox="1"/>
           <p:nvPr/>
         </p:nvSpPr>
@@ -19302,7 +19367,7 @@
       </p:sp>
       <p:sp>
         <p:nvSpPr>
-          <p:cNvPr id="209" name="Google Shape;209;p28"/>
+          <p:cNvPr id="207" name="Google Shape;207;p28"/>
           <p:cNvSpPr txBox="1"/>
           <p:nvPr>
             <p:ph idx="12" type="sldNum"/>
@@ -19354,7 +19419,7 @@
       </p:sp>
       <p:sp>
         <p:nvSpPr>
-          <p:cNvPr id="210" name="Google Shape;210;p28"/>
+          <p:cNvPr id="208" name="Google Shape;208;p28"/>
           <p:cNvSpPr txBox="1"/>
           <p:nvPr/>
         </p:nvSpPr>
@@ -19395,6 +19460,14 @@
               <a:buNone/>
             </a:pPr>
             <a:r>
+              <a:rPr lang="en-US" sz="1900">
+                <a:solidFill>
+                  <a:schemeClr val="dk1"/>
+                </a:solidFill>
+              </a:rPr>
+              <a:t>Logistic regression p</a:t>
+            </a:r>
+            <a:r>
               <a:rPr b="0" i="0" lang="en-US" sz="1900" u="none" cap="none" strike="noStrike">
                 <a:solidFill>
                   <a:schemeClr val="dk1"/>
@@ -19404,7 +19477,7 @@
                 <a:cs typeface="Arial"/>
                 <a:sym typeface="Arial"/>
               </a:rPr>
-              <a:t>Parameters like solver and the max_iter are tuned using GridSearchCV to get the highest accuracy possible.</a:t>
+              <a:t>arameters like solver and the max_iter are tuned using GridSearchCV to get the highest accuracy possible.</a:t>
             </a:r>
             <a:endParaRPr b="0" i="0" sz="1900" u="none" cap="none" strike="noStrike">
               <a:solidFill>
@@ -19420,21 +19493,22 @@
       </p:sp>
       <p:pic>
         <p:nvPicPr>
-          <p:cNvPr id="211" name="Google Shape;211;p28"/>
+          <p:cNvPr id="209" name="Google Shape;209;p28"/>
           <p:cNvPicPr preferRelativeResize="0"/>
           <p:nvPr/>
         </p:nvPicPr>
-        <p:blipFill rotWithShape="1">
+        <p:blipFill>
           <a:blip r:embed="rId3">
             <a:alphaModFix/>
           </a:blip>
-          <a:srcRect b="0" l="0" r="0" t="0"/>
-          <a:stretch/>
+          <a:stretch>
+            <a:fillRect/>
+          </a:stretch>
         </p:blipFill>
         <p:spPr>
           <a:xfrm>
-            <a:off x="152400" y="2269425"/>
-            <a:ext cx="10991808" cy="4138984"/>
+            <a:off x="125075" y="2637225"/>
+            <a:ext cx="11537464" cy="3592598"/>
           </a:xfrm>
           <a:prstGeom prst="rect">
             <a:avLst/>
@@ -19458,7 +19532,7 @@
   <p:cSld>
     <p:spTree>
       <p:nvGrpSpPr>
-        <p:cNvPr id="215" name="Shape 215"/>
+        <p:cNvPr id="213" name="Shape 213"/>
         <p:cNvGrpSpPr/>
         <p:nvPr/>
       </p:nvGrpSpPr>
@@ -19472,7 +19546,320 @@
       </p:grpSpPr>
       <p:sp>
         <p:nvSpPr>
+          <p:cNvPr id="214" name="Google Shape;214;p29"/>
+          <p:cNvSpPr txBox="1"/>
+          <p:nvPr/>
+        </p:nvSpPr>
+        <p:spPr>
+          <a:xfrm>
+            <a:off x="512164" y="384042"/>
+            <a:ext cx="9247200" cy="769500"/>
+          </a:xfrm>
+          <a:prstGeom prst="rect">
+            <a:avLst/>
+          </a:prstGeom>
+          <a:noFill/>
+          <a:ln>
+            <a:noFill/>
+          </a:ln>
+        </p:spPr>
+        <p:txBody>
+          <a:bodyPr anchorCtr="0" anchor="t" bIns="121900" lIns="121900" spcFirstLastPara="1" rIns="121900" wrap="square" tIns="121900">
+            <a:spAutoFit/>
+          </a:bodyPr>
+          <a:lstStyle/>
+          <a:p>
+            <a:pPr indent="0" lvl="0" marL="0" marR="0" rtl="0" algn="l">
+              <a:lnSpc>
+                <a:spcPct val="100000"/>
+              </a:lnSpc>
+              <a:spcBef>
+                <a:spcPts val="0"/>
+              </a:spcBef>
+              <a:spcAft>
+                <a:spcPts val="0"/>
+              </a:spcAft>
+              <a:buClr>
+                <a:srgbClr val="000000"/>
+              </a:buClr>
+              <a:buSzPts val="3400"/>
+              <a:buFont typeface="Arial"/>
+              <a:buNone/>
+            </a:pPr>
+            <a:r>
+              <a:rPr lang="en-US" sz="3400">
+                <a:latin typeface="Montserrat"/>
+                <a:ea typeface="Montserrat"/>
+                <a:cs typeface="Montserrat"/>
+                <a:sym typeface="Montserrat"/>
+              </a:rPr>
+              <a:t>Feature Importance</a:t>
+            </a:r>
+            <a:endParaRPr b="0" i="1" sz="3400" u="none" cap="none" strike="noStrike">
+              <a:solidFill>
+                <a:srgbClr val="000000"/>
+              </a:solidFill>
+              <a:latin typeface="Montserrat"/>
+              <a:ea typeface="Montserrat"/>
+              <a:cs typeface="Montserrat"/>
+              <a:sym typeface="Montserrat"/>
+            </a:endParaRPr>
+          </a:p>
+        </p:txBody>
+      </p:sp>
+      <p:sp>
+        <p:nvSpPr>
+          <p:cNvPr id="215" name="Google Shape;215;p29"/>
+          <p:cNvSpPr txBox="1"/>
+          <p:nvPr/>
+        </p:nvSpPr>
+        <p:spPr>
+          <a:xfrm>
+            <a:off x="494740" y="1091150"/>
+            <a:ext cx="11167800" cy="512400"/>
+          </a:xfrm>
+          <a:prstGeom prst="rect">
+            <a:avLst/>
+          </a:prstGeom>
+          <a:noFill/>
+          <a:ln>
+            <a:noFill/>
+          </a:ln>
+        </p:spPr>
+        <p:txBody>
+          <a:bodyPr anchorCtr="0" anchor="t" bIns="45700" lIns="91425" spcFirstLastPara="1" rIns="91425" wrap="square" tIns="45700">
+            <a:spAutoFit/>
+          </a:bodyPr>
+          <a:lstStyle/>
+          <a:p>
+            <a:pPr indent="0" lvl="0" marL="0" marR="0" rtl="0" algn="l">
+              <a:lnSpc>
+                <a:spcPct val="100000"/>
+              </a:lnSpc>
+              <a:spcBef>
+                <a:spcPts val="0"/>
+              </a:spcBef>
+              <a:spcAft>
+                <a:spcPts val="0"/>
+              </a:spcAft>
+              <a:buClr>
+                <a:srgbClr val="000000"/>
+              </a:buClr>
+              <a:buSzPts val="1400"/>
+              <a:buFont typeface="Arial"/>
+              <a:buNone/>
+            </a:pPr>
+            <a:r>
+              <a:t/>
+            </a:r>
+            <a:endParaRPr b="0" i="0" sz="1400" u="none" cap="none" strike="noStrike">
+              <a:solidFill>
+                <a:srgbClr val="000000"/>
+              </a:solidFill>
+              <a:latin typeface="Arial"/>
+              <a:ea typeface="Arial"/>
+              <a:cs typeface="Arial"/>
+              <a:sym typeface="Arial"/>
+            </a:endParaRPr>
+          </a:p>
+          <a:p>
+            <a:pPr indent="0" lvl="0" marL="0" marR="0" rtl="0" algn="l">
+              <a:lnSpc>
+                <a:spcPct val="100000"/>
+              </a:lnSpc>
+              <a:spcBef>
+                <a:spcPts val="0"/>
+              </a:spcBef>
+              <a:spcAft>
+                <a:spcPts val="0"/>
+              </a:spcAft>
+              <a:buClr>
+                <a:srgbClr val="000000"/>
+              </a:buClr>
+              <a:buSzPts val="1330"/>
+              <a:buFont typeface="Arial"/>
+              <a:buNone/>
+            </a:pPr>
+            <a:r>
+              <a:t/>
+            </a:r>
+            <a:endParaRPr b="0" i="0" sz="1330" u="sng" cap="none" strike="noStrike">
+              <a:solidFill>
+                <a:schemeClr val="dk1"/>
+              </a:solidFill>
+              <a:latin typeface="Montserrat"/>
+              <a:ea typeface="Montserrat"/>
+              <a:cs typeface="Montserrat"/>
+              <a:sym typeface="Montserrat"/>
+            </a:endParaRPr>
+          </a:p>
+        </p:txBody>
+      </p:sp>
+      <p:sp>
+        <p:nvSpPr>
           <p:cNvPr id="216" name="Google Shape;216;p29"/>
+          <p:cNvSpPr txBox="1"/>
+          <p:nvPr>
+            <p:ph idx="12" type="sldNum"/>
+          </p:nvPr>
+        </p:nvSpPr>
+        <p:spPr>
+          <a:xfrm>
+            <a:off x="11296611" y="6014423"/>
+            <a:ext cx="731700" cy="524700"/>
+          </a:xfrm>
+          <a:prstGeom prst="rect">
+            <a:avLst/>
+          </a:prstGeom>
+          <a:noFill/>
+          <a:ln>
+            <a:noFill/>
+          </a:ln>
+        </p:spPr>
+        <p:txBody>
+          <a:bodyPr anchorCtr="0" anchor="ctr" bIns="91425" lIns="91425" spcFirstLastPara="1" rIns="91425" wrap="square" tIns="91425">
+            <a:noAutofit/>
+          </a:bodyPr>
+          <a:lstStyle/>
+          <a:p>
+            <a:pPr indent="0" lvl="0" marL="0" marR="0" rtl="0" algn="l">
+              <a:lnSpc>
+                <a:spcPct val="100000"/>
+              </a:lnSpc>
+              <a:spcBef>
+                <a:spcPts val="0"/>
+              </a:spcBef>
+              <a:spcAft>
+                <a:spcPts val="0"/>
+              </a:spcAft>
+              <a:buClr>
+                <a:srgbClr val="000000"/>
+              </a:buClr>
+              <a:buSzPts val="1400"/>
+              <a:buFont typeface="Arial"/>
+              <a:buNone/>
+            </a:pPr>
+            <a:fld id="{00000000-1234-1234-1234-123412341234}" type="slidenum">
+              <a:rPr lang="en-US"/>
+              <a:t>‹#›</a:t>
+            </a:fld>
+            <a:endParaRPr/>
+          </a:p>
+        </p:txBody>
+      </p:sp>
+      <p:sp>
+        <p:nvSpPr>
+          <p:cNvPr id="217" name="Google Shape;217;p29"/>
+          <p:cNvSpPr txBox="1"/>
+          <p:nvPr/>
+        </p:nvSpPr>
+        <p:spPr>
+          <a:xfrm>
+            <a:off x="225200" y="1347525"/>
+            <a:ext cx="11540700" cy="769500"/>
+          </a:xfrm>
+          <a:prstGeom prst="rect">
+            <a:avLst/>
+          </a:prstGeom>
+          <a:noFill/>
+          <a:ln>
+            <a:noFill/>
+          </a:ln>
+        </p:spPr>
+        <p:txBody>
+          <a:bodyPr anchorCtr="0" anchor="t" bIns="91425" lIns="91425" spcFirstLastPara="1" rIns="91425" wrap="square" tIns="91425">
+            <a:noAutofit/>
+          </a:bodyPr>
+          <a:lstStyle/>
+          <a:p>
+            <a:pPr indent="0" lvl="0" marL="0" marR="0" rtl="0" algn="l">
+              <a:lnSpc>
+                <a:spcPct val="150000"/>
+              </a:lnSpc>
+              <a:spcBef>
+                <a:spcPts val="0"/>
+              </a:spcBef>
+              <a:spcAft>
+                <a:spcPts val="0"/>
+              </a:spcAft>
+              <a:buClr>
+                <a:srgbClr val="000000"/>
+              </a:buClr>
+              <a:buSzPts val="1900"/>
+              <a:buFont typeface="Arial"/>
+              <a:buNone/>
+            </a:pPr>
+            <a:r>
+              <a:t/>
+            </a:r>
+            <a:endParaRPr b="0" i="0" sz="1900" u="none" cap="none" strike="noStrike">
+              <a:solidFill>
+                <a:schemeClr val="dk1"/>
+              </a:solidFill>
+              <a:latin typeface="Arial"/>
+              <a:ea typeface="Arial"/>
+              <a:cs typeface="Arial"/>
+              <a:sym typeface="Arial"/>
+            </a:endParaRPr>
+          </a:p>
+        </p:txBody>
+      </p:sp>
+      <p:pic>
+        <p:nvPicPr>
+          <p:cNvPr id="218" name="Google Shape;218;p29"/>
+          <p:cNvPicPr preferRelativeResize="0"/>
+          <p:nvPr/>
+        </p:nvPicPr>
+        <p:blipFill>
+          <a:blip r:embed="rId3">
+            <a:alphaModFix/>
+          </a:blip>
+          <a:stretch>
+            <a:fillRect/>
+          </a:stretch>
+        </p:blipFill>
+        <p:spPr>
+          <a:xfrm>
+            <a:off x="1804561" y="2032125"/>
+            <a:ext cx="8582877" cy="4436175"/>
+          </a:xfrm>
+          <a:prstGeom prst="rect">
+            <a:avLst/>
+          </a:prstGeom>
+          <a:noFill/>
+          <a:ln>
+            <a:noFill/>
+          </a:ln>
+        </p:spPr>
+      </p:pic>
+    </p:spTree>
+  </p:cSld>
+  <p:clrMapOvr>
+    <a:masterClrMapping/>
+  </p:clrMapOvr>
+</p:sld>
+</file>
+
+<file path=ppt/slides/slide16.xml><?xml version="1.0" encoding="utf-8"?>
+<p:sld xmlns:a="http://schemas.openxmlformats.org/drawingml/2006/main" xmlns:r="http://schemas.openxmlformats.org/officeDocument/2006/relationships" xmlns:mc="http://schemas.openxmlformats.org/markup-compatibility/2006" xmlns:mv="urn:schemas-microsoft-com:mac:vml" xmlns:p="http://schemas.openxmlformats.org/presentationml/2006/main" xmlns:c="http://schemas.openxmlformats.org/drawingml/2006/chart" xmlns:dgm="http://schemas.openxmlformats.org/drawingml/2006/diagram" xmlns:o="urn:schemas-microsoft-com:office:office" xmlns:v="urn:schemas-microsoft-com:vml" xmlns:pvml="urn:schemas-microsoft-com:office:powerpoint" xmlns:com="http://schemas.openxmlformats.org/drawingml/2006/compatibility" xmlns:p14="http://schemas.microsoft.com/office/powerpoint/2010/main" xmlns:p15="http://schemas.microsoft.com/office/powerpoint/2012/main" xmlns:ahyp="http://schemas.microsoft.com/office/drawing/2018/hyperlinkcolor">
+  <p:cSld>
+    <p:spTree>
+      <p:nvGrpSpPr>
+        <p:cNvPr id="222" name="Shape 222"/>
+        <p:cNvGrpSpPr/>
+        <p:nvPr/>
+      </p:nvGrpSpPr>
+      <p:grpSpPr>
+        <a:xfrm>
+          <a:off x="0" y="0"/>
+          <a:ext cx="0" cy="0"/>
+          <a:chOff x="0" y="0"/>
+          <a:chExt cx="0" cy="0"/>
+        </a:xfrm>
+      </p:grpSpPr>
+      <p:sp>
+        <p:nvSpPr>
+          <p:cNvPr id="223" name="Google Shape;223;p30"/>
           <p:cNvSpPr txBox="1"/>
           <p:nvPr>
             <p:ph idx="12" type="sldNum"/>
@@ -19524,7 +19911,7 @@
       </p:sp>
       <p:sp>
         <p:nvSpPr>
-          <p:cNvPr id="217" name="Google Shape;217;p29"/>
+          <p:cNvPr id="224" name="Google Shape;224;p30"/>
           <p:cNvSpPr txBox="1"/>
           <p:nvPr/>
         </p:nvSpPr>
@@ -19590,7 +19977,7 @@
       </p:sp>
       <p:sp>
         <p:nvSpPr>
-          <p:cNvPr id="218" name="Google Shape;218;p29"/>
+          <p:cNvPr id="225" name="Google Shape;225;p30"/>
           <p:cNvSpPr txBox="1"/>
           <p:nvPr/>
         </p:nvSpPr>
@@ -19647,7 +20034,7 @@
       </p:sp>
       <p:sp>
         <p:nvSpPr>
-          <p:cNvPr id="219" name="Google Shape;219;p29"/>
+          <p:cNvPr id="226" name="Google Shape;226;p30"/>
           <p:cNvSpPr txBox="1"/>
           <p:nvPr/>
         </p:nvSpPr>
@@ -19697,7 +20084,27 @@
                 <a:cs typeface="Arial"/>
                 <a:sym typeface="Arial"/>
               </a:rPr>
-              <a:t>Machine learning algorithm, Logistic regression is well suited for this problem among the other classifier algorithms with 80% accuracy.</a:t>
+              <a:t>Machine learning algorithm, Logistic regression is well suited for this problem among the other classifier algorithms with 8</a:t>
+            </a:r>
+            <a:r>
+              <a:rPr lang="en-US" sz="1900">
+                <a:solidFill>
+                  <a:schemeClr val="dk1"/>
+                </a:solidFill>
+              </a:rPr>
+              <a:t>1</a:t>
+            </a:r>
+            <a:r>
+              <a:rPr b="0" i="0" lang="en-US" sz="1900" u="none" cap="none" strike="noStrike">
+                <a:solidFill>
+                  <a:schemeClr val="dk1"/>
+                </a:solidFill>
+                <a:latin typeface="Arial"/>
+                <a:ea typeface="Arial"/>
+                <a:cs typeface="Arial"/>
+                <a:sym typeface="Arial"/>
+              </a:rPr>
+              <a:t>% accuracy.</a:t>
             </a:r>
             <a:endParaRPr b="0" i="0" sz="1900" u="none" cap="none" strike="noStrike">
               <a:solidFill>
@@ -20043,12 +20450,12 @@
 </p:sld>
 </file>
 
-<file path=ppt/slides/slide16.xml><?xml version="1.0" encoding="utf-8"?>
+<file path=ppt/slides/slide17.xml><?xml version="1.0" encoding="utf-8"?>
 <p:sld xmlns:a="http://schemas.openxmlformats.org/drawingml/2006/main" xmlns:r="http://schemas.openxmlformats.org/officeDocument/2006/relationships" xmlns:mc="http://schemas.openxmlformats.org/markup-compatibility/2006" xmlns:mv="urn:schemas-microsoft-com:mac:vml" xmlns:p="http://schemas.openxmlformats.org/presentationml/2006/main" xmlns:c="http://schemas.openxmlformats.org/drawingml/2006/chart" xmlns:dgm="http://schemas.openxmlformats.org/drawingml/2006/diagram" xmlns:o="urn:schemas-microsoft-com:office:office" xmlns:v="urn:schemas-microsoft-com:vml" xmlns:pvml="urn:schemas-microsoft-com:office:powerpoint" xmlns:com="http://schemas.openxmlformats.org/drawingml/2006/compatibility" xmlns:p14="http://schemas.microsoft.com/office/powerpoint/2010/main" xmlns:p15="http://schemas.microsoft.com/office/powerpoint/2012/main" xmlns:ahyp="http://schemas.microsoft.com/office/drawing/2018/hyperlinkcolor">
   <p:cSld>
     <p:spTree>
       <p:nvGrpSpPr>
-        <p:cNvPr id="223" name="Shape 223"/>
+        <p:cNvPr id="230" name="Shape 230"/>
         <p:cNvGrpSpPr/>
         <p:nvPr/>
       </p:nvGrpSpPr>
@@ -20062,7 +20469,7 @@
       </p:grpSpPr>
       <p:pic>
         <p:nvPicPr>
-          <p:cNvPr id="224" name="Google Shape;224;p30"/>
+          <p:cNvPr id="231" name="Google Shape;231;p31"/>
           <p:cNvPicPr preferRelativeResize="0"/>
           <p:nvPr/>
         </p:nvPicPr>
@@ -20089,7 +20496,7 @@
       </p:pic>
       <p:sp>
         <p:nvSpPr>
-          <p:cNvPr id="225" name="Google Shape;225;p30"/>
+          <p:cNvPr id="232" name="Google Shape;232;p31"/>
           <p:cNvSpPr txBox="1"/>
           <p:nvPr>
             <p:ph idx="12" type="sldNum"/>
@@ -20141,7 +20548,7 @@
       </p:sp>
       <p:sp>
         <p:nvSpPr>
-          <p:cNvPr id="226" name="Google Shape;226;p30"/>
+          <p:cNvPr id="233" name="Google Shape;233;p31"/>
           <p:cNvSpPr txBox="1"/>
           <p:nvPr/>
         </p:nvSpPr>
@@ -23972,8 +24379,8 @@
         </p:nvSpPr>
         <p:spPr>
           <a:xfrm>
-            <a:off x="475646" y="-167264"/>
-            <a:ext cx="11182953" cy="5999912"/>
+            <a:off x="89925" y="2337425"/>
+            <a:ext cx="4755000" cy="3946200"/>
           </a:xfrm>
           <a:prstGeom prst="rect">
             <a:avLst/>
@@ -24009,20 +24416,141 @@
             <a:r>
               <a:t/>
             </a:r>
-            <a:endParaRPr b="0" i="0" sz="1333" u="none" cap="none" strike="noStrike">
+            <a:endParaRPr sz="1900">
               <a:solidFill>
                 <a:schemeClr val="dk1"/>
               </a:solidFill>
-              <a:latin typeface="Arial"/>
-              <a:ea typeface="Arial"/>
-              <a:cs typeface="Arial"/>
-              <a:sym typeface="Arial"/>
             </a:endParaRPr>
           </a:p>
           <a:p>
             <a:pPr indent="0" lvl="0" marL="0" marR="0" rtl="0" algn="l">
               <a:lnSpc>
-                <a:spcPct val="100000"/>
+                <a:spcPct val="150000"/>
+              </a:lnSpc>
+              <a:spcBef>
+                <a:spcPts val="0"/>
+              </a:spcBef>
+              <a:spcAft>
+                <a:spcPts val="0"/>
+              </a:spcAft>
+              <a:buClr>
+                <a:srgbClr val="000000"/>
+              </a:buClr>
+              <a:buSzPts val="1333"/>
+              <a:buFont typeface="Arial"/>
+              <a:buNone/>
+            </a:pPr>
+            <a:r>
+              <a:rPr lang="en-US" sz="1900">
+                <a:solidFill>
+                  <a:schemeClr val="dk1"/>
+                </a:solidFill>
+              </a:rPr>
+              <a:t>This function,</a:t>
+            </a:r>
+            <a:endParaRPr sz="1900">
+              <a:solidFill>
+                <a:schemeClr val="dk1"/>
+              </a:solidFill>
+            </a:endParaRPr>
+          </a:p>
+          <a:p>
+            <a:pPr indent="-349250" lvl="0" marL="457200" marR="0" rtl="0" algn="l">
+              <a:lnSpc>
+                <a:spcPct val="150000"/>
+              </a:lnSpc>
+              <a:spcBef>
+                <a:spcPts val="0"/>
+              </a:spcBef>
+              <a:spcAft>
+                <a:spcPts val="0"/>
+              </a:spcAft>
+              <a:buClr>
+                <a:schemeClr val="dk1"/>
+              </a:buClr>
+              <a:buSzPts val="1900"/>
+              <a:buChar char="➢"/>
+            </a:pPr>
+            <a:r>
+              <a:rPr lang="en-US" sz="1900">
+                <a:solidFill>
+                  <a:schemeClr val="dk1"/>
+                </a:solidFill>
+              </a:rPr>
+              <a:t> Removes the unimportant columns </a:t>
+            </a:r>
+            <a:endParaRPr sz="1900">
+              <a:solidFill>
+                <a:schemeClr val="dk1"/>
+              </a:solidFill>
+            </a:endParaRPr>
+          </a:p>
+          <a:p>
+            <a:pPr indent="-349250" lvl="0" marL="457200" marR="0" rtl="0" algn="l">
+              <a:lnSpc>
+                <a:spcPct val="150000"/>
+              </a:lnSpc>
+              <a:spcBef>
+                <a:spcPts val="0"/>
+              </a:spcBef>
+              <a:spcAft>
+                <a:spcPts val="0"/>
+              </a:spcAft>
+              <a:buClr>
+                <a:schemeClr val="dk1"/>
+              </a:buClr>
+              <a:buSzPts val="1900"/>
+              <a:buChar char="➢"/>
+            </a:pPr>
+            <a:r>
+              <a:rPr lang="en-US" sz="1900">
+                <a:solidFill>
+                  <a:schemeClr val="dk1"/>
+                </a:solidFill>
+              </a:rPr>
+              <a:t> Handles the missing values </a:t>
+            </a:r>
+            <a:endParaRPr sz="1900">
+              <a:solidFill>
+                <a:schemeClr val="dk1"/>
+              </a:solidFill>
+            </a:endParaRPr>
+          </a:p>
+          <a:p>
+            <a:pPr indent="-349250" lvl="0" marL="457200" marR="0" rtl="0" algn="l">
+              <a:lnSpc>
+                <a:spcPct val="150000"/>
+              </a:lnSpc>
+              <a:spcBef>
+                <a:spcPts val="0"/>
+              </a:spcBef>
+              <a:spcAft>
+                <a:spcPts val="0"/>
+              </a:spcAft>
+              <a:buClr>
+                <a:schemeClr val="dk1"/>
+              </a:buClr>
+              <a:buSzPts val="1900"/>
+              <a:buChar char="➢"/>
+            </a:pPr>
+            <a:r>
+              <a:rPr lang="en-US" sz="1900">
+                <a:solidFill>
+                  <a:schemeClr val="dk1"/>
+                </a:solidFill>
+              </a:rPr>
+              <a:t> Encodes the categorical data</a:t>
+            </a:r>
+            <a:endParaRPr sz="1900">
+              <a:solidFill>
+                <a:schemeClr val="dk1"/>
+              </a:solidFill>
+            </a:endParaRPr>
+          </a:p>
+          <a:p>
+            <a:pPr indent="457200" lvl="0" marL="0" marR="0" rtl="0" algn="l">
+              <a:lnSpc>
+                <a:spcPct val="150000"/>
               </a:lnSpc>
               <a:spcBef>
                 <a:spcPts val="0"/>
@@ -24040,19 +24568,47 @@
             <a:r>
               <a:t/>
             </a:r>
-            <a:endParaRPr b="0" i="0" sz="1333" u="none" cap="none" strike="noStrike">
+            <a:endParaRPr sz="1900">
               <a:solidFill>
                 <a:schemeClr val="dk1"/>
               </a:solidFill>
-              <a:latin typeface="Arial"/>
-              <a:ea typeface="Arial"/>
-              <a:cs typeface="Arial"/>
-              <a:sym typeface="Arial"/>
             </a:endParaRPr>
           </a:p>
           <a:p>
             <a:pPr indent="0" lvl="0" marL="0" marR="0" rtl="0" algn="l">
               <a:lnSpc>
+                <a:spcPct val="150000"/>
+              </a:lnSpc>
+              <a:spcBef>
+                <a:spcPts val="0"/>
+              </a:spcBef>
+              <a:spcAft>
+                <a:spcPts val="0"/>
+              </a:spcAft>
+              <a:buClr>
+                <a:srgbClr val="000000"/>
+              </a:buClr>
+              <a:buSzPts val="1333"/>
+              <a:buFont typeface="Arial"/>
+              <a:buNone/>
+            </a:pPr>
+            <a:r>
+              <a:rPr lang="en-US" sz="1900">
+                <a:solidFill>
+                  <a:schemeClr val="dk1"/>
+                </a:solidFill>
+              </a:rPr>
+              <a:t>Makes the data suitable for the supervised machine learning algorithm.</a:t>
+            </a:r>
+            <a:endParaRPr sz="1900">
+              <a:solidFill>
+                <a:schemeClr val="dk1"/>
+              </a:solidFill>
+            </a:endParaRPr>
+          </a:p>
+          <a:p>
+            <a:pPr indent="0" lvl="0" marL="0" marR="0" rtl="0" algn="l">
+              <a:lnSpc>
                 <a:spcPct val="100000"/>
               </a:lnSpc>
               <a:spcBef>
@@ -24071,14 +24627,10 @@
             <a:r>
               <a:t/>
             </a:r>
-            <a:endParaRPr b="0" i="0" sz="1333" u="none" cap="none" strike="noStrike">
+            <a:endParaRPr sz="1900">
               <a:solidFill>
                 <a:schemeClr val="dk1"/>
               </a:solidFill>
-              <a:latin typeface="Arial"/>
-              <a:ea typeface="Arial"/>
-              <a:cs typeface="Arial"/>
-              <a:sym typeface="Arial"/>
             </a:endParaRPr>
           </a:p>
           <a:p>
@@ -24102,14 +24654,10 @@
             <a:r>
               <a:t/>
             </a:r>
-            <a:endParaRPr b="0" i="0" sz="1333" u="sng" cap="none" strike="noStrike">
+            <a:endParaRPr i="0" sz="1900" u="none" cap="none" strike="noStrike">
               <a:solidFill>
                 <a:schemeClr val="dk1"/>
               </a:solidFill>
-              <a:latin typeface="Arial"/>
-              <a:ea typeface="Arial"/>
-              <a:cs typeface="Arial"/>
-              <a:sym typeface="Arial"/>
             </a:endParaRPr>
           </a:p>
           <a:p>
@@ -24133,14 +24681,10 @@
             <a:r>
               <a:t/>
             </a:r>
-            <a:endParaRPr b="0" i="0" sz="1333" u="sng" cap="none" strike="noStrike">
+            <a:endParaRPr i="0" sz="1900" u="none" cap="none" strike="noStrike">
               <a:solidFill>
                 <a:schemeClr val="dk1"/>
               </a:solidFill>
-              <a:latin typeface="Arial"/>
-              <a:ea typeface="Arial"/>
-              <a:cs typeface="Arial"/>
-              <a:sym typeface="Arial"/>
             </a:endParaRPr>
           </a:p>
           <a:p>
@@ -24164,14 +24708,10 @@
             <a:r>
               <a:t/>
             </a:r>
-            <a:endParaRPr b="0" i="0" sz="1333" u="none" cap="none" strike="noStrike">
+            <a:endParaRPr i="0" sz="1900" u="sng" cap="none" strike="noStrike">
               <a:solidFill>
                 <a:schemeClr val="dk1"/>
               </a:solidFill>
-              <a:latin typeface="Calibri"/>
-              <a:ea typeface="Calibri"/>
-              <a:cs typeface="Calibri"/>
-              <a:sym typeface="Calibri"/>
             </a:endParaRPr>
           </a:p>
           <a:p>
@@ -24195,14 +24735,10 @@
             <a:r>
               <a:t/>
             </a:r>
-            <a:endParaRPr b="0" i="0" sz="1333" u="none" cap="none" strike="noStrike">
+            <a:endParaRPr i="0" sz="1900" u="sng" cap="none" strike="noStrike">
               <a:solidFill>
                 <a:schemeClr val="dk1"/>
               </a:solidFill>
-              <a:latin typeface="Calibri"/>
-              <a:ea typeface="Calibri"/>
-              <a:cs typeface="Calibri"/>
-              <a:sym typeface="Calibri"/>
             </a:endParaRPr>
           </a:p>
           <a:p>
@@ -24226,14 +24762,10 @@
             <a:r>
               <a:t/>
             </a:r>
-            <a:endParaRPr b="1" i="0" sz="1333" u="sng" cap="none" strike="noStrike">
+            <a:endParaRPr i="0" sz="1900" u="none" cap="none" strike="noStrike">
               <a:solidFill>
                 <a:schemeClr val="dk1"/>
               </a:solidFill>
-              <a:latin typeface="Arial"/>
-              <a:ea typeface="Arial"/>
-              <a:cs typeface="Arial"/>
-              <a:sym typeface="Arial"/>
             </a:endParaRPr>
           </a:p>
           <a:p>
@@ -24250,21 +24782,71 @@
               <a:buClr>
                 <a:srgbClr val="000000"/>
               </a:buClr>
-              <a:buSzPts val="2400"/>
+              <a:buSzPts val="1333"/>
               <a:buFont typeface="Arial"/>
               <a:buNone/>
             </a:pPr>
             <a:r>
               <a:t/>
             </a:r>
-            <a:endParaRPr b="0" i="0" sz="2400" u="none" cap="none" strike="noStrike">
+            <a:endParaRPr i="0" sz="1900" u="none" cap="none" strike="noStrike">
               <a:solidFill>
                 <a:schemeClr val="dk1"/>
               </a:solidFill>
-              <a:latin typeface="Calibri"/>
-              <a:ea typeface="Calibri"/>
-              <a:cs typeface="Calibri"/>
-              <a:sym typeface="Calibri"/>
+            </a:endParaRPr>
+          </a:p>
+          <a:p>
+            <a:pPr indent="0" lvl="0" marL="0" marR="0" rtl="0" algn="l">
+              <a:lnSpc>
+                <a:spcPct val="100000"/>
+              </a:lnSpc>
+              <a:spcBef>
+                <a:spcPts val="0"/>
+              </a:spcBef>
+              <a:spcAft>
+                <a:spcPts val="0"/>
+              </a:spcAft>
+              <a:buClr>
+                <a:srgbClr val="000000"/>
+              </a:buClr>
+              <a:buSzPts val="1333"/>
+              <a:buFont typeface="Arial"/>
+              <a:buNone/>
+            </a:pPr>
+            <a:r>
+              <a:t/>
+            </a:r>
+            <a:endParaRPr b="1" i="0" sz="1900" u="sng" cap="none" strike="noStrike">
+              <a:solidFill>
+                <a:schemeClr val="dk1"/>
+              </a:solidFill>
+            </a:endParaRPr>
+          </a:p>
+          <a:p>
+            <a:pPr indent="0" lvl="0" marL="0" marR="0" rtl="0" algn="l">
+              <a:lnSpc>
+                <a:spcPct val="100000"/>
+              </a:lnSpc>
+              <a:spcBef>
+                <a:spcPts val="0"/>
+              </a:spcBef>
+              <a:spcAft>
+                <a:spcPts val="0"/>
+              </a:spcAft>
+              <a:buClr>
+                <a:srgbClr val="000000"/>
+              </a:buClr>
+              <a:buSzPts val="2400"/>
+              <a:buFont typeface="Arial"/>
+              <a:buNone/>
+            </a:pPr>
+            <a:r>
+              <a:t/>
+            </a:r>
+            <a:endParaRPr i="0" sz="1900" u="none" cap="none" strike="noStrike">
+              <a:solidFill>
+                <a:schemeClr val="dk1"/>
+              </a:solidFill>
             </a:endParaRPr>
           </a:p>
         </p:txBody>
@@ -24393,17 +24975,18 @@
           <p:cNvPicPr preferRelativeResize="0"/>
           <p:nvPr/>
         </p:nvPicPr>
-        <p:blipFill rotWithShape="1">
+        <p:blipFill>
           <a:blip r:embed="rId3">
             <a:alphaModFix/>
           </a:blip>
-          <a:srcRect b="0" l="0" r="0" t="0"/>
-          <a:stretch/>
+          <a:stretch>
+            <a:fillRect/>
+          </a:stretch>
         </p:blipFill>
         <p:spPr>
           <a:xfrm>
-            <a:off x="354637" y="1448175"/>
-            <a:ext cx="8892226" cy="6858001"/>
+            <a:off x="4970138" y="1578675"/>
+            <a:ext cx="6924675" cy="5353050"/>
           </a:xfrm>
           <a:prstGeom prst="rect">
             <a:avLst/>

</xml_diff>